<commit_message>
addign kmeans hw (not linking yet).
</commit_message>
<xml_diff>
--- a/slides/06-MaxFlow-2.pptx
+++ b/slides/06-MaxFlow-2.pptx
@@ -233,7 +233,7 @@
           <a:p>
             <a:fld id="{9A9F7FD5-2840-4607-A4CD-0A8A66D9D61D}" type="datetimeFigureOut">
               <a:rPr lang="en-US" smtClean="0"/>
-              <a:t>10/31/22</a:t>
+              <a:t>11/2/22</a:t>
             </a:fld>
             <a:endParaRPr lang="en-US"/>
           </a:p>
@@ -926,7 +926,7 @@
           <a:p>
             <a:fld id="{088A2421-D2CD-4522-A1BA-E4F59ED821B7}" type="datetime1">
               <a:rPr lang="en-US" smtClean="0"/>
-              <a:t>10/31/22</a:t>
+              <a:t>11/2/22</a:t>
             </a:fld>
             <a:endParaRPr lang="en-US"/>
           </a:p>
@@ -1201,7 +1201,7 @@
           <a:p>
             <a:fld id="{DA91928D-0C55-4D8D-9D16-4C05754E5356}" type="datetime1">
               <a:rPr lang="en-US" smtClean="0"/>
-              <a:t>10/31/22</a:t>
+              <a:t>11/2/22</a:t>
             </a:fld>
             <a:endParaRPr lang="en-US"/>
           </a:p>
@@ -1456,7 +1456,7 @@
           <a:p>
             <a:fld id="{584CEDDD-253B-4C38-A621-35D8BA950C17}" type="datetime1">
               <a:rPr lang="en-US" smtClean="0"/>
-              <a:t>10/31/22</a:t>
+              <a:t>11/2/22</a:t>
             </a:fld>
             <a:endParaRPr lang="en-US"/>
           </a:p>
@@ -1624,7 +1624,7 @@
           <a:p>
             <a:fld id="{BF0967E4-28CB-45C9-B82C-D6B22AD4F0EB}" type="datetime1">
               <a:rPr lang="en-US" smtClean="0"/>
-              <a:t>10/31/22</a:t>
+              <a:t>11/2/22</a:t>
             </a:fld>
             <a:endParaRPr lang="en-US"/>
           </a:p>
@@ -1802,7 +1802,7 @@
           <a:p>
             <a:fld id="{2454C693-B405-44E1-A127-B7CE8B45C1E1}" type="datetime1">
               <a:rPr lang="en-US" smtClean="0"/>
-              <a:t>10/31/22</a:t>
+              <a:t>11/2/22</a:t>
             </a:fld>
             <a:endParaRPr lang="en-US"/>
           </a:p>
@@ -1987,7 +1987,7 @@
           <a:p>
             <a:fld id="{26B28102-2E91-4DD7-8E8B-98B790A12701}" type="datetime1">
               <a:rPr lang="en-US" smtClean="0"/>
-              <a:t>10/31/22</a:t>
+              <a:t>11/2/22</a:t>
             </a:fld>
             <a:endParaRPr lang="en-US"/>
           </a:p>
@@ -2178,7 +2178,7 @@
           <a:p>
             <a:fld id="{0B5AF985-6D44-417A-9881-D208468CBA07}" type="datetime1">
               <a:rPr lang="en-US" smtClean="0"/>
-              <a:t>10/31/22</a:t>
+              <a:t>11/2/22</a:t>
             </a:fld>
             <a:endParaRPr lang="en-US"/>
           </a:p>
@@ -2368,7 +2368,7 @@
           <a:p>
             <a:fld id="{26B28102-2E91-4DD7-8E8B-98B790A12701}" type="datetime1">
               <a:rPr lang="en-US" smtClean="0"/>
-              <a:t>10/31/22</a:t>
+              <a:t>11/2/22</a:t>
             </a:fld>
             <a:endParaRPr lang="en-US"/>
           </a:p>
@@ -2614,7 +2614,7 @@
           <a:p>
             <a:fld id="{3A604A86-E8D2-4E57-8D6D-61E2D175474B}" type="datetime1">
               <a:rPr lang="en-US" smtClean="0"/>
-              <a:t>10/31/22</a:t>
+              <a:t>11/2/22</a:t>
             </a:fld>
             <a:endParaRPr lang="en-US"/>
           </a:p>
@@ -2910,7 +2910,7 @@
           <a:p>
             <a:fld id="{DC921DF3-1FB0-45DC-97EF-461960E13574}" type="datetime1">
               <a:rPr lang="en-US" smtClean="0"/>
-              <a:t>10/31/22</a:t>
+              <a:t>11/2/22</a:t>
             </a:fld>
             <a:endParaRPr lang="en-US"/>
           </a:p>
@@ -3335,7 +3335,7 @@
           <a:p>
             <a:fld id="{092B088E-2809-46D8-B43F-738015D878CC}" type="datetime1">
               <a:rPr lang="en-US" smtClean="0"/>
-              <a:t>10/31/22</a:t>
+              <a:t>11/2/22</a:t>
             </a:fld>
             <a:endParaRPr lang="en-US"/>
           </a:p>
@@ -3463,7 +3463,7 @@
           <a:p>
             <a:fld id="{8208D42A-BC08-426E-9E11-483BA9D61AF6}" type="datetime1">
               <a:rPr lang="en-US" smtClean="0"/>
-              <a:t>10/31/22</a:t>
+              <a:t>11/2/22</a:t>
             </a:fld>
             <a:endParaRPr lang="en-US"/>
           </a:p>
@@ -3596,7 +3596,7 @@
           <a:p>
             <a:fld id="{26B28102-2E91-4DD7-8E8B-98B790A12701}" type="datetime1">
               <a:rPr lang="en-US" smtClean="0"/>
-              <a:t>10/31/22</a:t>
+              <a:t>11/2/22</a:t>
             </a:fld>
             <a:endParaRPr lang="en-US"/>
           </a:p>
@@ -3692,7 +3692,7 @@
           <a:p>
             <a:fld id="{37D5C786-44E1-4BD5-AD14-75F3EA166B5A}" type="datetime1">
               <a:rPr lang="en-US" smtClean="0"/>
-              <a:t>10/31/22</a:t>
+              <a:t>11/2/22</a:t>
             </a:fld>
             <a:endParaRPr lang="en-US"/>
           </a:p>
@@ -3903,7 +3903,7 @@
           <a:p>
             <a:fld id="{26B28102-2E91-4DD7-8E8B-98B790A12701}" type="datetime1">
               <a:rPr lang="en-US" smtClean="0"/>
-              <a:t>10/31/22</a:t>
+              <a:t>11/2/22</a:t>
             </a:fld>
             <a:endParaRPr lang="en-US"/>
           </a:p>
@@ -6640,7 +6640,7 @@
           <a:noFill/>
           <a:extLst>
             <a:ext uri="{909E8E84-426E-40dd-AFC4-6F175D3DCCD1}">
-              <a14:hiddenFill xmlns="" xmlns:a14="http://schemas.microsoft.com/office/drawing/2010/main">
+              <a14:hiddenFill xmlns:a14="http://schemas.microsoft.com/office/drawing/2010/main" xmlns="">
                 <a:solidFill>
                   <a:srgbClr val="FFFFFF"/>
                 </a:solidFill>

</xml_diff>